<commit_message>
added git repo in presenation
</commit_message>
<xml_diff>
--- a/Srihari_Busam_MS-ADS-Presentation.pptx
+++ b/Srihari_Busam_MS-ADS-Presentation.pptx
@@ -7027,7 +7027,7 @@
           <a:p>
             <a:fld id="{C4EDFC01-9F45-445E-A8F1-81A112EE4F26}" type="datetimeFigureOut">
               <a:rPr lang="en-US" smtClean="0"/>
-              <a:t>3/13/2022</a:t>
+              <a:t>3/14/2022</a:t>
             </a:fld>
             <a:endParaRPr lang="en-US"/>
           </a:p>
@@ -7688,7 +7688,7 @@
           <a:p>
             <a:fld id="{43C97625-BF87-4FD9-B6A3-7784DB263167}" type="datetimeFigureOut">
               <a:rPr lang="en-US" smtClean="0"/>
-              <a:t>3/13/2022</a:t>
+              <a:t>3/14/2022</a:t>
             </a:fld>
             <a:endParaRPr lang="en-US"/>
           </a:p>
@@ -7992,7 +7992,7 @@
           <a:p>
             <a:fld id="{43C97625-BF87-4FD9-B6A3-7784DB263167}" type="datetimeFigureOut">
               <a:rPr lang="en-US" smtClean="0"/>
-              <a:t>3/13/2022</a:t>
+              <a:t>3/14/2022</a:t>
             </a:fld>
             <a:endParaRPr lang="en-US"/>
           </a:p>
@@ -8186,7 +8186,7 @@
           <a:p>
             <a:fld id="{43C97625-BF87-4FD9-B6A3-7784DB263167}" type="datetimeFigureOut">
               <a:rPr lang="en-US" smtClean="0"/>
-              <a:t>3/13/2022</a:t>
+              <a:t>3/14/2022</a:t>
             </a:fld>
             <a:endParaRPr lang="en-US"/>
           </a:p>
@@ -8449,7 +8449,7 @@
           <a:p>
             <a:fld id="{43C97625-BF87-4FD9-B6A3-7784DB263167}" type="datetimeFigureOut">
               <a:rPr lang="en-US" smtClean="0"/>
-              <a:t>3/13/2022</a:t>
+              <a:t>3/14/2022</a:t>
             </a:fld>
             <a:endParaRPr lang="en-US"/>
           </a:p>
@@ -8885,7 +8885,7 @@
           <a:p>
             <a:fld id="{43C97625-BF87-4FD9-B6A3-7784DB263167}" type="datetimeFigureOut">
               <a:rPr lang="en-US" smtClean="0"/>
-              <a:t>3/13/2022</a:t>
+              <a:t>3/14/2022</a:t>
             </a:fld>
             <a:endParaRPr lang="en-US"/>
           </a:p>
@@ -9422,7 +9422,7 @@
           <a:p>
             <a:fld id="{43C97625-BF87-4FD9-B6A3-7784DB263167}" type="datetimeFigureOut">
               <a:rPr lang="en-US" smtClean="0"/>
-              <a:t>3/13/2022</a:t>
+              <a:t>3/14/2022</a:t>
             </a:fld>
             <a:endParaRPr lang="en-US"/>
           </a:p>
@@ -10304,7 +10304,7 @@
           <a:p>
             <a:fld id="{43C97625-BF87-4FD9-B6A3-7784DB263167}" type="datetimeFigureOut">
               <a:rPr lang="en-US" smtClean="0"/>
-              <a:t>3/13/2022</a:t>
+              <a:t>3/14/2022</a:t>
             </a:fld>
             <a:endParaRPr lang="en-US"/>
           </a:p>
@@ -10474,7 +10474,7 @@
           <a:p>
             <a:fld id="{43C97625-BF87-4FD9-B6A3-7784DB263167}" type="datetimeFigureOut">
               <a:rPr lang="en-US" smtClean="0"/>
-              <a:t>3/13/2022</a:t>
+              <a:t>3/14/2022</a:t>
             </a:fld>
             <a:endParaRPr lang="en-US"/>
           </a:p>
@@ -10658,7 +10658,7 @@
           <a:p>
             <a:fld id="{43C97625-BF87-4FD9-B6A3-7784DB263167}" type="datetimeFigureOut">
               <a:rPr lang="en-US" smtClean="0"/>
-              <a:t>3/13/2022</a:t>
+              <a:t>3/14/2022</a:t>
             </a:fld>
             <a:endParaRPr lang="en-US"/>
           </a:p>
@@ -10828,7 +10828,7 @@
           <a:p>
             <a:fld id="{43C97625-BF87-4FD9-B6A3-7784DB263167}" type="datetimeFigureOut">
               <a:rPr lang="en-US" smtClean="0"/>
-              <a:t>3/13/2022</a:t>
+              <a:t>3/14/2022</a:t>
             </a:fld>
             <a:endParaRPr lang="en-US"/>
           </a:p>
@@ -11072,7 +11072,7 @@
           <a:p>
             <a:fld id="{43C97625-BF87-4FD9-B6A3-7784DB263167}" type="datetimeFigureOut">
               <a:rPr lang="en-US" smtClean="0"/>
-              <a:t>3/13/2022</a:t>
+              <a:t>3/14/2022</a:t>
             </a:fld>
             <a:endParaRPr lang="en-US"/>
           </a:p>
@@ -11313,7 +11313,7 @@
           <a:p>
             <a:fld id="{43C97625-BF87-4FD9-B6A3-7784DB263167}" type="datetimeFigureOut">
               <a:rPr lang="en-US" smtClean="0"/>
-              <a:t>3/13/2022</a:t>
+              <a:t>3/14/2022</a:t>
             </a:fld>
             <a:endParaRPr lang="en-US"/>
           </a:p>
@@ -11796,7 +11796,7 @@
           <a:p>
             <a:fld id="{43C97625-BF87-4FD9-B6A3-7784DB263167}" type="datetimeFigureOut">
               <a:rPr lang="en-US" smtClean="0"/>
-              <a:t>3/13/2022</a:t>
+              <a:t>3/14/2022</a:t>
             </a:fld>
             <a:endParaRPr lang="en-US"/>
           </a:p>
@@ -11914,7 +11914,7 @@
           <a:p>
             <a:fld id="{43C97625-BF87-4FD9-B6A3-7784DB263167}" type="datetimeFigureOut">
               <a:rPr lang="en-US" smtClean="0"/>
-              <a:t>3/13/2022</a:t>
+              <a:t>3/14/2022</a:t>
             </a:fld>
             <a:endParaRPr lang="en-US"/>
           </a:p>
@@ -12009,7 +12009,7 @@
           <a:p>
             <a:fld id="{43C97625-BF87-4FD9-B6A3-7784DB263167}" type="datetimeFigureOut">
               <a:rPr lang="en-US" smtClean="0"/>
-              <a:t>3/13/2022</a:t>
+              <a:t>3/14/2022</a:t>
             </a:fld>
             <a:endParaRPr lang="en-US"/>
           </a:p>
@@ -12264,7 +12264,7 @@
           <a:p>
             <a:fld id="{43C97625-BF87-4FD9-B6A3-7784DB263167}" type="datetimeFigureOut">
               <a:rPr lang="en-US" smtClean="0"/>
-              <a:t>3/13/2022</a:t>
+              <a:t>3/14/2022</a:t>
             </a:fld>
             <a:endParaRPr lang="en-US"/>
           </a:p>
@@ -12570,7 +12570,7 @@
           <a:p>
             <a:fld id="{43C97625-BF87-4FD9-B6A3-7784DB263167}" type="datetimeFigureOut">
               <a:rPr lang="en-US" smtClean="0"/>
-              <a:t>3/13/2022</a:t>
+              <a:t>3/14/2022</a:t>
             </a:fld>
             <a:endParaRPr lang="en-US"/>
           </a:p>
@@ -12804,7 +12804,7 @@
           <a:p>
             <a:fld id="{43C97625-BF87-4FD9-B6A3-7784DB263167}" type="datetimeFigureOut">
               <a:rPr lang="en-US" smtClean="0"/>
-              <a:t>3/13/2022</a:t>
+              <a:t>3/14/2022</a:t>
             </a:fld>
             <a:endParaRPr lang="en-US"/>
           </a:p>
@@ -16627,10 +16627,30 @@
           <a:p>
             <a:r>
               <a:rPr lang="en-US" sz="2000" dirty="0"/>
+              <a:t>GIT REPO(projects and code): </a:t>
+            </a:r>
+            <a:r>
+              <a:rPr lang="en-US" sz="2000" dirty="0">
+                <a:hlinkClick r:id="rId2"/>
+              </a:rPr>
+              <a:t>https://github.com/srihari-busam/MS-ADS-Portfolio</a:t>
+            </a:r>
+            <a:endParaRPr lang="en-US" sz="2000" dirty="0"/>
+          </a:p>
+          <a:p>
+            <a:r>
+              <a:rPr lang="en-US" sz="2000" dirty="0"/>
+              <a:t>Kaggle competitions referenced:</a:t>
+            </a:r>
+          </a:p>
+          <a:p>
+            <a:pPr lvl="1"/>
+            <a:r>
+              <a:rPr lang="en-US" sz="1600" dirty="0"/>
               <a:t>HPA Kaggle competition: </a:t>
             </a:r>
             <a:r>
-              <a:rPr lang="en-US" sz="2000" u="sng" dirty="0">
+              <a:rPr lang="en-US" sz="1600" u="sng" dirty="0">
                 <a:solidFill>
                   <a:srgbClr val="0563C1"/>
                 </a:solidFill>
@@ -16638,11 +16658,11 @@
                 <a:latin typeface="Calibri" panose="020F0502020204030204" pitchFamily="34" charset="0"/>
                 <a:ea typeface="Calibri" panose="020F0502020204030204" pitchFamily="34" charset="0"/>
                 <a:cs typeface="Times New Roman" panose="02020603050405020304" pitchFamily="18" charset="0"/>
-                <a:hlinkClick r:id="rId2"/>
+                <a:hlinkClick r:id="rId3"/>
               </a:rPr>
               <a:t>https://www.kaggle.com/c/hpa-single-cell-image-classification</a:t>
             </a:r>
-            <a:endParaRPr lang="en-US" sz="2000" u="sng" dirty="0">
+            <a:endParaRPr lang="en-US" sz="1600" u="sng" dirty="0">
               <a:solidFill>
                 <a:srgbClr val="0563C1"/>
               </a:solidFill>
@@ -16653,20 +16673,25 @@
             </a:endParaRPr>
           </a:p>
           <a:p>
-            <a:r>
-              <a:rPr lang="en-US" sz="2000" dirty="0"/>
+            <a:pPr lvl="1"/>
+            <a:r>
+              <a:rPr lang="en-US" sz="1600" dirty="0"/>
               <a:t>Video game dataset from Kaggle: </a:t>
             </a:r>
             <a:r>
-              <a:rPr lang="en-US" sz="2000" dirty="0">
-                <a:hlinkClick r:id="rId3"/>
+              <a:rPr lang="en-US" sz="1600" dirty="0">
+                <a:hlinkClick r:id="rId4"/>
               </a:rPr>
               <a:t>https://www.kaggle.com/sidtwr/videogames-sales-dataset</a:t>
             </a:r>
             <a:r>
-              <a:rPr lang="en-US" sz="2000" dirty="0"/>
+              <a:rPr lang="en-US" sz="1600" dirty="0"/>
               <a:t> </a:t>
             </a:r>
+          </a:p>
+          <a:p>
+            <a:pPr lvl="1"/>
+            <a:endParaRPr lang="en-US" sz="1800" dirty="0"/>
           </a:p>
         </p:txBody>
       </p:sp>
@@ -22317,6 +22342,21 @@
 </file>
 
 <file path=customXml/item1.xml><?xml version="1.0" encoding="utf-8"?>
+<p:properties xmlns:p="http://schemas.microsoft.com/office/2006/metadata/properties" xmlns:xsi="http://www.w3.org/2001/XMLSchema-instance" xmlns:pc="http://schemas.microsoft.com/office/infopath/2007/PartnerControls">
+  <documentManagement/>
+</p:properties>
+</file>
+
+<file path=customXml/item2.xml><?xml version="1.0" encoding="utf-8"?>
+<?mso-contentType ?>
+<FormTemplates xmlns="http://schemas.microsoft.com/sharepoint/v3/contenttype/forms">
+  <Display>DocumentLibraryForm</Display>
+  <Edit>DocumentLibraryForm</Edit>
+  <New>DocumentLibraryForm</New>
+</FormTemplates>
+</file>
+
+<file path=customXml/item3.xml><?xml version="1.0" encoding="utf-8"?>
 <ct:contentTypeSchema xmlns:ct="http://schemas.microsoft.com/office/2006/metadata/contentType" xmlns:ma="http://schemas.microsoft.com/office/2006/metadata/properties/metaAttributes" ct:_="" ma:_="" ma:contentTypeName="Document" ma:contentTypeID="0x0101006E7876CE5A991D42848489547AF4CBAE" ma:contentTypeVersion="7" ma:contentTypeDescription="Create a new document." ma:contentTypeScope="" ma:versionID="89cc19e11a35f1f1733091247c63d3c9">
   <xsd:schema xmlns:xsd="http://www.w3.org/2001/XMLSchema" xmlns:xs="http://www.w3.org/2001/XMLSchema" xmlns:p="http://schemas.microsoft.com/office/2006/metadata/properties" xmlns:ns3="7a2312a6-a8c3-41ac-9a29-150ba0710c9a" xmlns:ns4="45cf2939-8fa7-49e3-ad34-0c168c521b81" targetNamespace="http://schemas.microsoft.com/office/2006/metadata/properties" ma:root="true" ma:fieldsID="e83f5769af76e5bf1778458621af7ef9" ns3:_="" ns4:_="">
     <xsd:import namespace="7a2312a6-a8c3-41ac-9a29-150ba0710c9a"/>
@@ -22501,22 +22541,32 @@
 </ct:contentTypeSchema>
 </file>
 
-<file path=customXml/item2.xml><?xml version="1.0" encoding="utf-8"?>
-<?mso-contentType ?>
-<FormTemplates xmlns="http://schemas.microsoft.com/sharepoint/v3/contenttype/forms">
-  <Display>DocumentLibraryForm</Display>
-  <Edit>DocumentLibraryForm</Edit>
-  <New>DocumentLibraryForm</New>
-</FormTemplates>
+<file path=customXml/itemProps1.xml><?xml version="1.0" encoding="utf-8"?>
+<ds:datastoreItem xmlns:ds="http://schemas.openxmlformats.org/officeDocument/2006/customXml" ds:itemID="{B6CAC4AE-67DD-479D-A1E3-723FE1202C57}">
+  <ds:schemaRefs>
+    <ds:schemaRef ds:uri="http://www.w3.org/XML/1998/namespace"/>
+    <ds:schemaRef ds:uri="7a2312a6-a8c3-41ac-9a29-150ba0710c9a"/>
+    <ds:schemaRef ds:uri="http://schemas.microsoft.com/office/2006/documentManagement/types"/>
+    <ds:schemaRef ds:uri="http://purl.org/dc/terms/"/>
+    <ds:schemaRef ds:uri="http://schemas.microsoft.com/office/infopath/2007/PartnerControls"/>
+    <ds:schemaRef ds:uri="http://schemas.openxmlformats.org/package/2006/metadata/core-properties"/>
+    <ds:schemaRef ds:uri="http://purl.org/dc/elements/1.1/"/>
+    <ds:schemaRef ds:uri="45cf2939-8fa7-49e3-ad34-0c168c521b81"/>
+    <ds:schemaRef ds:uri="http://schemas.microsoft.com/office/2006/metadata/properties"/>
+    <ds:schemaRef ds:uri="http://purl.org/dc/dcmitype/"/>
+  </ds:schemaRefs>
+</ds:datastoreItem>
 </file>
 
-<file path=customXml/item3.xml><?xml version="1.0" encoding="utf-8"?>
-<p:properties xmlns:p="http://schemas.microsoft.com/office/2006/metadata/properties" xmlns:xsi="http://www.w3.org/2001/XMLSchema-instance" xmlns:pc="http://schemas.microsoft.com/office/infopath/2007/PartnerControls">
-  <documentManagement/>
-</p:properties>
+<file path=customXml/itemProps2.xml><?xml version="1.0" encoding="utf-8"?>
+<ds:datastoreItem xmlns:ds="http://schemas.openxmlformats.org/officeDocument/2006/customXml" ds:itemID="{42CA6DBA-0F9E-49D4-986C-16023887AF58}">
+  <ds:schemaRefs>
+    <ds:schemaRef ds:uri="http://schemas.microsoft.com/sharepoint/v3/contenttype/forms"/>
+  </ds:schemaRefs>
+</ds:datastoreItem>
 </file>
 
-<file path=customXml/itemProps1.xml><?xml version="1.0" encoding="utf-8"?>
+<file path=customXml/itemProps3.xml><?xml version="1.0" encoding="utf-8"?>
 <ds:datastoreItem xmlns:ds="http://schemas.openxmlformats.org/officeDocument/2006/customXml" ds:itemID="{C2021213-501F-43B0-98F1-FE78227F530C}">
   <ds:schemaRefs>
     <ds:schemaRef ds:uri="http://schemas.microsoft.com/office/2006/metadata/contentType"/>
@@ -22533,29 +22583,4 @@
     <ds:schemaRef ds:uri="http://schemas.microsoft.com/internal/obd"/>
   </ds:schemaRefs>
 </ds:datastoreItem>
-</file>
-
-<file path=customXml/itemProps2.xml><?xml version="1.0" encoding="utf-8"?>
-<ds:datastoreItem xmlns:ds="http://schemas.openxmlformats.org/officeDocument/2006/customXml" ds:itemID="{42CA6DBA-0F9E-49D4-986C-16023887AF58}">
-  <ds:schemaRefs>
-    <ds:schemaRef ds:uri="http://schemas.microsoft.com/sharepoint/v3/contenttype/forms"/>
-  </ds:schemaRefs>
-</ds:datastoreItem>
-</file>
-
-<file path=customXml/itemProps3.xml><?xml version="1.0" encoding="utf-8"?>
-<ds:datastoreItem xmlns:ds="http://schemas.openxmlformats.org/officeDocument/2006/customXml" ds:itemID="{B6CAC4AE-67DD-479D-A1E3-723FE1202C57}">
-  <ds:schemaRefs>
-    <ds:schemaRef ds:uri="http://www.w3.org/XML/1998/namespace"/>
-    <ds:schemaRef ds:uri="7a2312a6-a8c3-41ac-9a29-150ba0710c9a"/>
-    <ds:schemaRef ds:uri="http://schemas.microsoft.com/office/2006/documentManagement/types"/>
-    <ds:schemaRef ds:uri="http://purl.org/dc/terms/"/>
-    <ds:schemaRef ds:uri="http://schemas.microsoft.com/office/infopath/2007/PartnerControls"/>
-    <ds:schemaRef ds:uri="http://schemas.openxmlformats.org/package/2006/metadata/core-properties"/>
-    <ds:schemaRef ds:uri="http://purl.org/dc/elements/1.1/"/>
-    <ds:schemaRef ds:uri="45cf2939-8fa7-49e3-ad34-0c168c521b81"/>
-    <ds:schemaRef ds:uri="http://schemas.microsoft.com/office/2006/metadata/properties"/>
-    <ds:schemaRef ds:uri="http://purl.org/dc/dcmitype/"/>
-  </ds:schemaRefs>
-</ds:datastoreItem>
 </file>
</xml_diff>